<commit_message>
Add slide on B-n-B strategies
</commit_message>
<xml_diff>
--- a/article/pcgtsp.pptx
+++ b/article/pcgtsp.pptx
@@ -8,6 +8,7 @@
     <p:sldId id="256" r:id="rId2"/>
     <p:sldId id="257" r:id="rId3"/>
     <p:sldId id="258" r:id="rId4"/>
+    <p:sldId id="259" r:id="rId5"/>
   </p:sldIdLst>
   <p:sldSz cx="12192000" cy="6858000"/>
   <p:notesSz cx="6858000" cy="9144000"/>
@@ -261,7 +262,7 @@
           <a:p>
             <a:fld id="{9CF85C88-418E-4F5A-8CF4-5781FE3E76C1}" type="datetimeFigureOut">
               <a:rPr lang="ru-RU" smtClean="0"/>
-              <a:t>18.09.2021</a:t>
+              <a:t>20.09.2021</a:t>
             </a:fld>
             <a:endParaRPr lang="ru-RU"/>
           </a:p>
@@ -459,7 +460,7 @@
           <a:p>
             <a:fld id="{9CF85C88-418E-4F5A-8CF4-5781FE3E76C1}" type="datetimeFigureOut">
               <a:rPr lang="ru-RU" smtClean="0"/>
-              <a:t>18.09.2021</a:t>
+              <a:t>20.09.2021</a:t>
             </a:fld>
             <a:endParaRPr lang="ru-RU"/>
           </a:p>
@@ -667,7 +668,7 @@
           <a:p>
             <a:fld id="{9CF85C88-418E-4F5A-8CF4-5781FE3E76C1}" type="datetimeFigureOut">
               <a:rPr lang="ru-RU" smtClean="0"/>
-              <a:t>18.09.2021</a:t>
+              <a:t>20.09.2021</a:t>
             </a:fld>
             <a:endParaRPr lang="ru-RU"/>
           </a:p>
@@ -865,7 +866,7 @@
           <a:p>
             <a:fld id="{9CF85C88-418E-4F5A-8CF4-5781FE3E76C1}" type="datetimeFigureOut">
               <a:rPr lang="ru-RU" smtClean="0"/>
-              <a:t>18.09.2021</a:t>
+              <a:t>20.09.2021</a:t>
             </a:fld>
             <a:endParaRPr lang="ru-RU"/>
           </a:p>
@@ -1140,7 +1141,7 @@
           <a:p>
             <a:fld id="{9CF85C88-418E-4F5A-8CF4-5781FE3E76C1}" type="datetimeFigureOut">
               <a:rPr lang="ru-RU" smtClean="0"/>
-              <a:t>18.09.2021</a:t>
+              <a:t>20.09.2021</a:t>
             </a:fld>
             <a:endParaRPr lang="ru-RU"/>
           </a:p>
@@ -1405,7 +1406,7 @@
           <a:p>
             <a:fld id="{9CF85C88-418E-4F5A-8CF4-5781FE3E76C1}" type="datetimeFigureOut">
               <a:rPr lang="ru-RU" smtClean="0"/>
-              <a:t>18.09.2021</a:t>
+              <a:t>20.09.2021</a:t>
             </a:fld>
             <a:endParaRPr lang="ru-RU"/>
           </a:p>
@@ -1817,7 +1818,7 @@
           <a:p>
             <a:fld id="{9CF85C88-418E-4F5A-8CF4-5781FE3E76C1}" type="datetimeFigureOut">
               <a:rPr lang="ru-RU" smtClean="0"/>
-              <a:t>18.09.2021</a:t>
+              <a:t>20.09.2021</a:t>
             </a:fld>
             <a:endParaRPr lang="ru-RU"/>
           </a:p>
@@ -1958,7 +1959,7 @@
           <a:p>
             <a:fld id="{9CF85C88-418E-4F5A-8CF4-5781FE3E76C1}" type="datetimeFigureOut">
               <a:rPr lang="ru-RU" smtClean="0"/>
-              <a:t>18.09.2021</a:t>
+              <a:t>20.09.2021</a:t>
             </a:fld>
             <a:endParaRPr lang="ru-RU"/>
           </a:p>
@@ -2071,7 +2072,7 @@
           <a:p>
             <a:fld id="{9CF85C88-418E-4F5A-8CF4-5781FE3E76C1}" type="datetimeFigureOut">
               <a:rPr lang="ru-RU" smtClean="0"/>
-              <a:t>18.09.2021</a:t>
+              <a:t>20.09.2021</a:t>
             </a:fld>
             <a:endParaRPr lang="ru-RU"/>
           </a:p>
@@ -2382,7 +2383,7 @@
           <a:p>
             <a:fld id="{9CF85C88-418E-4F5A-8CF4-5781FE3E76C1}" type="datetimeFigureOut">
               <a:rPr lang="ru-RU" smtClean="0"/>
-              <a:t>18.09.2021</a:t>
+              <a:t>20.09.2021</a:t>
             </a:fld>
             <a:endParaRPr lang="ru-RU"/>
           </a:p>
@@ -2670,7 +2671,7 @@
           <a:p>
             <a:fld id="{9CF85C88-418E-4F5A-8CF4-5781FE3E76C1}" type="datetimeFigureOut">
               <a:rPr lang="ru-RU" smtClean="0"/>
-              <a:t>18.09.2021</a:t>
+              <a:t>20.09.2021</a:t>
             </a:fld>
             <a:endParaRPr lang="ru-RU"/>
           </a:p>
@@ -2911,7 +2912,7 @@
           <a:p>
             <a:fld id="{9CF85C88-418E-4F5A-8CF4-5781FE3E76C1}" type="datetimeFigureOut">
               <a:rPr lang="ru-RU" smtClean="0"/>
-              <a:t>18.09.2021</a:t>
+              <a:t>20.09.2021</a:t>
             </a:fld>
             <a:endParaRPr lang="ru-RU"/>
           </a:p>
@@ -8791,7 +8792,15 @@
             </a:r>
             <a:r>
               <a:rPr lang="en-US" dirty="0"/>
-              <a:t>PCGTSP,</a:t>
+              <a:t>PCGTSP</a:t>
+            </a:r>
+            <a:r>
+              <a:rPr lang="en-US" baseline="30000" dirty="0"/>
+              <a:t>1</a:t>
+            </a:r>
+            <a:r>
+              <a:rPr lang="en-US" dirty="0"/>
+              <a:t>,</a:t>
             </a:r>
           </a:p>
           <a:p>
@@ -8827,10 +8836,2035 @@
           </a:p>
         </p:txBody>
       </p:sp>
+      <p:sp>
+        <p:nvSpPr>
+          <p:cNvPr id="7" name="TextBox 6">
+            <a:extLst>
+              <a:ext uri="{FF2B5EF4-FFF2-40B4-BE49-F238E27FC236}">
+                <a16:creationId xmlns:a16="http://schemas.microsoft.com/office/drawing/2014/main" id="{42AEC94D-1F33-4FEA-A87F-D32CF9AAFF48}"/>
+              </a:ext>
+            </a:extLst>
+          </p:cNvPr>
+          <p:cNvSpPr txBox="1"/>
+          <p:nvPr/>
+        </p:nvSpPr>
+        <p:spPr>
+          <a:xfrm>
+            <a:off x="0" y="6369489"/>
+            <a:ext cx="12103916" cy="415498"/>
+          </a:xfrm>
+          <a:prstGeom prst="rect">
+            <a:avLst/>
+          </a:prstGeom>
+          <a:noFill/>
+        </p:spPr>
+        <p:txBody>
+          <a:bodyPr wrap="square">
+            <a:spAutoFit/>
+          </a:bodyPr>
+          <a:lstStyle/>
+          <a:p>
+            <a:r>
+              <a:rPr lang="en-US" sz="1050" baseline="30000" dirty="0">
+                <a:effectLst/>
+                <a:latin typeface="Calibri" panose="020F0502020204030204" pitchFamily="34" charset="0"/>
+                <a:ea typeface="Calibri" panose="020F0502020204030204" pitchFamily="34" charset="0"/>
+                <a:cs typeface="F"/>
+              </a:rPr>
+              <a:t>1</a:t>
+            </a:r>
+            <a:r>
+              <a:rPr lang="en-US" sz="1050" dirty="0">
+                <a:effectLst/>
+                <a:latin typeface="Calibri" panose="020F0502020204030204" pitchFamily="34" charset="0"/>
+                <a:ea typeface="Calibri" panose="020F0502020204030204" pitchFamily="34" charset="0"/>
+                <a:cs typeface="F"/>
+              </a:rPr>
+              <a:t>Khachay M., </a:t>
+            </a:r>
+            <a:r>
+              <a:rPr lang="en-US" sz="1050" dirty="0" err="1">
+                <a:effectLst/>
+                <a:latin typeface="Calibri" panose="020F0502020204030204" pitchFamily="34" charset="0"/>
+                <a:ea typeface="Calibri" panose="020F0502020204030204" pitchFamily="34" charset="0"/>
+                <a:cs typeface="F"/>
+              </a:rPr>
+              <a:t>Kudriavtsev</a:t>
+            </a:r>
+            <a:r>
+              <a:rPr lang="en-US" sz="1050" dirty="0">
+                <a:effectLst/>
+                <a:latin typeface="Calibri" panose="020F0502020204030204" pitchFamily="34" charset="0"/>
+                <a:ea typeface="Calibri" panose="020F0502020204030204" pitchFamily="34" charset="0"/>
+                <a:cs typeface="F"/>
+              </a:rPr>
+              <a:t> A., Petunin A. PCGLNS: A Heuristic Solver for the Precedence Constrained Generalized Traveling Salesman Problem // Optimization and Applications. Т. 12422 / </a:t>
+            </a:r>
+            <a:r>
+              <a:rPr lang="en-US" sz="1050" dirty="0" err="1">
+                <a:effectLst/>
+                <a:latin typeface="Calibri" panose="020F0502020204030204" pitchFamily="34" charset="0"/>
+                <a:ea typeface="Calibri" panose="020F0502020204030204" pitchFamily="34" charset="0"/>
+                <a:cs typeface="F"/>
+              </a:rPr>
+              <a:t>под</a:t>
+            </a:r>
+            <a:r>
+              <a:rPr lang="en-US" sz="1050" dirty="0">
+                <a:effectLst/>
+                <a:latin typeface="Calibri" panose="020F0502020204030204" pitchFamily="34" charset="0"/>
+                <a:ea typeface="Calibri" panose="020F0502020204030204" pitchFamily="34" charset="0"/>
+                <a:cs typeface="F"/>
+              </a:rPr>
+              <a:t> </a:t>
+            </a:r>
+            <a:r>
+              <a:rPr lang="en-US" sz="1050" dirty="0" err="1">
+                <a:effectLst/>
+                <a:latin typeface="Calibri" panose="020F0502020204030204" pitchFamily="34" charset="0"/>
+                <a:ea typeface="Calibri" panose="020F0502020204030204" pitchFamily="34" charset="0"/>
+                <a:cs typeface="F"/>
+              </a:rPr>
+              <a:t>ред</a:t>
+            </a:r>
+            <a:r>
+              <a:rPr lang="en-US" sz="1050" dirty="0">
+                <a:effectLst/>
+                <a:latin typeface="Calibri" panose="020F0502020204030204" pitchFamily="34" charset="0"/>
+                <a:ea typeface="Calibri" panose="020F0502020204030204" pitchFamily="34" charset="0"/>
+                <a:cs typeface="F"/>
+              </a:rPr>
+              <a:t>. N. </a:t>
+            </a:r>
+            <a:r>
+              <a:rPr lang="en-US" sz="1050" dirty="0" err="1">
+                <a:effectLst/>
+                <a:latin typeface="Calibri" panose="020F0502020204030204" pitchFamily="34" charset="0"/>
+                <a:ea typeface="Calibri" panose="020F0502020204030204" pitchFamily="34" charset="0"/>
+                <a:cs typeface="F"/>
+              </a:rPr>
+              <a:t>Olenev,Y</a:t>
+            </a:r>
+            <a:r>
+              <a:rPr lang="en-US" sz="1050" dirty="0">
+                <a:effectLst/>
+                <a:latin typeface="Calibri" panose="020F0502020204030204" pitchFamily="34" charset="0"/>
+                <a:ea typeface="Calibri" panose="020F0502020204030204" pitchFamily="34" charset="0"/>
+                <a:cs typeface="F"/>
+              </a:rPr>
+              <a:t>. Evtushenko, M. Khachay, V. </a:t>
+            </a:r>
+            <a:r>
+              <a:rPr lang="en-US" sz="1050" dirty="0" err="1">
+                <a:effectLst/>
+                <a:latin typeface="Calibri" panose="020F0502020204030204" pitchFamily="34" charset="0"/>
+                <a:ea typeface="Calibri" panose="020F0502020204030204" pitchFamily="34" charset="0"/>
+                <a:cs typeface="F"/>
+              </a:rPr>
+              <a:t>Malkova</a:t>
+            </a:r>
+            <a:r>
+              <a:rPr lang="en-US" sz="1050" dirty="0">
+                <a:effectLst/>
+                <a:latin typeface="Calibri" panose="020F0502020204030204" pitchFamily="34" charset="0"/>
+                <a:ea typeface="Calibri" panose="020F0502020204030204" pitchFamily="34" charset="0"/>
+                <a:cs typeface="F"/>
+              </a:rPr>
+              <a:t>. — Cham : Springer International Publishing, 2020. — С. 196—208. — (Lecture Notes in Computer Science). — ISBN 978-3-030-62867-3. — DOI:10.1007/978-3-030-62867-3_15.</a:t>
+            </a:r>
+            <a:endParaRPr lang="ru-RU" sz="1050" dirty="0"/>
+          </a:p>
+        </p:txBody>
+      </p:sp>
     </p:spTree>
     <p:extLst>
       <p:ext uri="{BB962C8B-B14F-4D97-AF65-F5344CB8AC3E}">
         <p14:creationId xmlns:p14="http://schemas.microsoft.com/office/powerpoint/2010/main" val="1653780134"/>
+      </p:ext>
+    </p:extLst>
+  </p:cSld>
+  <p:clrMapOvr>
+    <a:masterClrMapping/>
+  </p:clrMapOvr>
+</p:sld>
+</file>
+
+<file path=ppt/slides/slide4.xml><?xml version="1.0" encoding="utf-8"?>
+<p:sld xmlns:a="http://schemas.openxmlformats.org/drawingml/2006/main" xmlns:r="http://schemas.openxmlformats.org/officeDocument/2006/relationships" xmlns:p="http://schemas.openxmlformats.org/presentationml/2006/main">
+  <p:cSld>
+    <p:spTree>
+      <p:nvGrpSpPr>
+        <p:cNvPr id="1" name=""/>
+        <p:cNvGrpSpPr/>
+        <p:nvPr/>
+      </p:nvGrpSpPr>
+      <p:grpSpPr>
+        <a:xfrm>
+          <a:off x="0" y="0"/>
+          <a:ext cx="0" cy="0"/>
+          <a:chOff x="0" y="0"/>
+          <a:chExt cx="0" cy="0"/>
+        </a:xfrm>
+      </p:grpSpPr>
+      <p:sp>
+        <p:nvSpPr>
+          <p:cNvPr id="4" name="TextBox 3">
+            <a:extLst>
+              <a:ext uri="{FF2B5EF4-FFF2-40B4-BE49-F238E27FC236}">
+                <a16:creationId xmlns:a16="http://schemas.microsoft.com/office/drawing/2014/main" id="{D9C5CA3A-2AFA-4D9D-8537-CF97947D0471}"/>
+              </a:ext>
+            </a:extLst>
+          </p:cNvPr>
+          <p:cNvSpPr txBox="1"/>
+          <p:nvPr/>
+        </p:nvSpPr>
+        <p:spPr>
+          <a:xfrm>
+            <a:off x="9899009" y="109057"/>
+            <a:ext cx="1418465" cy="369332"/>
+          </a:xfrm>
+          <a:prstGeom prst="rect">
+            <a:avLst/>
+          </a:prstGeom>
+          <a:noFill/>
+        </p:spPr>
+        <p:txBody>
+          <a:bodyPr wrap="none" rtlCol="0">
+            <a:spAutoFit/>
+          </a:bodyPr>
+          <a:lstStyle/>
+          <a:p>
+            <a:r>
+              <a:rPr lang="ru-RU" dirty="0"/>
+              <a:t>Общие идеи</a:t>
+            </a:r>
+          </a:p>
+        </p:txBody>
+      </p:sp>
+      <mc:AlternateContent xmlns:mc="http://schemas.openxmlformats.org/markup-compatibility/2006">
+        <mc:Choice xmlns:a14="http://schemas.microsoft.com/office/drawing/2010/main" Requires="a14">
+          <p:sp>
+            <p:nvSpPr>
+              <p:cNvPr id="5" name="TextBox 4">
+                <a:extLst>
+                  <a:ext uri="{FF2B5EF4-FFF2-40B4-BE49-F238E27FC236}">
+                    <a16:creationId xmlns:a16="http://schemas.microsoft.com/office/drawing/2014/main" id="{E67035DC-3B0F-43AA-8041-0E7536B5DDB9}"/>
+                  </a:ext>
+                </a:extLst>
+              </p:cNvPr>
+              <p:cNvSpPr txBox="1"/>
+              <p:nvPr/>
+            </p:nvSpPr>
+            <p:spPr>
+              <a:xfrm>
+                <a:off x="318782" y="1476462"/>
+                <a:ext cx="5707311" cy="4524315"/>
+              </a:xfrm>
+              <a:prstGeom prst="rect">
+                <a:avLst/>
+              </a:prstGeom>
+              <a:solidFill>
+                <a:schemeClr val="bg1"/>
+              </a:solidFill>
+              <a:ln>
+                <a:solidFill>
+                  <a:schemeClr val="tx1"/>
+                </a:solidFill>
+              </a:ln>
+              <a:effectLst>
+                <a:outerShdw blurRad="50800" dist="38100" dir="2700000" algn="tl" rotWithShape="0">
+                  <a:prstClr val="black">
+                    <a:alpha val="40000"/>
+                  </a:prstClr>
+                </a:outerShdw>
+              </a:effectLst>
+            </p:spPr>
+            <p:txBody>
+              <a:bodyPr wrap="square" rtlCol="0">
+                <a:spAutoFit/>
+              </a:bodyPr>
+              <a:lstStyle/>
+              <a:p>
+                <a:pPr algn="ctr"/>
+                <a:r>
+                  <a:rPr lang="ru-RU" b="1" dirty="0"/>
+                  <a:t>Стратегия поиска нижних оценок</a:t>
+                </a:r>
+              </a:p>
+              <a:p>
+                <a:pPr algn="ctr"/>
+                <a:endParaRPr lang="ru-RU" dirty="0"/>
+              </a:p>
+              <a:p>
+                <a:pPr marL="342900" indent="-342900">
+                  <a:buFont typeface="+mj-lt"/>
+                  <a:buAutoNum type="arabicPeriod"/>
+                </a:pPr>
+                <a:r>
+                  <a:rPr lang="ru-RU" dirty="0"/>
+                  <a:t>Построение вспомогательной задачи </a:t>
+                </a:r>
+                <a:r>
+                  <a:rPr lang="en-US" dirty="0"/>
+                  <a:t>PCGTSP </a:t>
+                </a:r>
+                <a:r>
+                  <a:rPr lang="en-US" dirty="0">
+                    <a:sym typeface="Symbol" panose="05050102010706020507" pitchFamily="18" charset="2"/>
+                  </a:rPr>
+                  <a:t> </a:t>
+                </a:r>
+                <a14:m>
+                  <m:oMath xmlns:m="http://schemas.openxmlformats.org/officeDocument/2006/math">
+                    <m:r>
+                      <a:rPr lang="ru-RU" sz="1800" i="1" smtClean="0">
+                        <a:effectLst/>
+                        <a:latin typeface="Cambria Math" panose="02040503050406030204" pitchFamily="18" charset="0"/>
+                        <a:ea typeface="Calibri" panose="020F0502020204030204" pitchFamily="34" charset="0"/>
+                        <a:cs typeface="F"/>
+                      </a:rPr>
+                      <m:t>𝒫</m:t>
+                    </m:r>
+                  </m:oMath>
+                </a14:m>
+                <a:endParaRPr lang="en-US" sz="1800" dirty="0">
+                  <a:effectLst/>
+                  <a:ea typeface="Calibri" panose="020F0502020204030204" pitchFamily="34" charset="0"/>
+                  <a:cs typeface="F"/>
+                </a:endParaRPr>
+              </a:p>
+              <a:p>
+                <a14:m>
+                  <m:oMathPara xmlns:m="http://schemas.openxmlformats.org/officeDocument/2006/math">
+                    <m:oMathParaPr>
+                      <m:jc m:val="centerGroup"/>
+                    </m:oMathParaPr>
+                    <m:oMath xmlns:m="http://schemas.openxmlformats.org/officeDocument/2006/math">
+                      <m:r>
+                        <a:rPr lang="ru-RU" sz="1800" i="1" smtClean="0">
+                          <a:effectLst/>
+                          <a:latin typeface="Cambria Math" panose="02040503050406030204" pitchFamily="18" charset="0"/>
+                          <a:ea typeface="Calibri" panose="020F0502020204030204" pitchFamily="34" charset="0"/>
+                          <a:cs typeface="F"/>
+                        </a:rPr>
+                        <m:t>𝐿𝐵</m:t>
+                      </m:r>
+                      <m:r>
+                        <a:rPr lang="ru-RU" sz="1800">
+                          <a:effectLst/>
+                          <a:latin typeface="Cambria Math" panose="02040503050406030204" pitchFamily="18" charset="0"/>
+                          <a:ea typeface="Calibri" panose="020F0502020204030204" pitchFamily="34" charset="0"/>
+                          <a:cs typeface="F"/>
+                        </a:rPr>
+                        <m:t>=</m:t>
+                      </m:r>
+                      <m:sSub>
+                        <m:sSubPr>
+                          <m:ctrlPr>
+                            <a:rPr lang="ru-RU" i="1">
+                              <a:effectLst/>
+                              <a:latin typeface="Cambria Math" panose="02040503050406030204" pitchFamily="18" charset="0"/>
+                            </a:rPr>
+                          </m:ctrlPr>
+                        </m:sSubPr>
+                        <m:e>
+                          <m:r>
+                            <a:rPr lang="ru-RU" sz="1800" i="1">
+                              <a:effectLst/>
+                              <a:latin typeface="Cambria Math" panose="02040503050406030204" pitchFamily="18" charset="0"/>
+                              <a:ea typeface="Calibri" panose="020F0502020204030204" pitchFamily="34" charset="0"/>
+                              <a:cs typeface="F"/>
+                            </a:rPr>
+                            <m:t>𝑐</m:t>
+                          </m:r>
+                        </m:e>
+                        <m:sub>
+                          <m:r>
+                            <m:rPr>
+                              <m:sty m:val="p"/>
+                            </m:rPr>
+                            <a:rPr lang="ru-RU" sz="1800">
+                              <a:effectLst/>
+                              <a:latin typeface="Cambria Math" panose="02040503050406030204" pitchFamily="18" charset="0"/>
+                              <a:ea typeface="Calibri" panose="020F0502020204030204" pitchFamily="34" charset="0"/>
+                              <a:cs typeface="F"/>
+                            </a:rPr>
+                            <m:t>min</m:t>
+                          </m:r>
+                        </m:sub>
+                      </m:sSub>
+                      <m:r>
+                        <a:rPr lang="ru-RU" sz="1800">
+                          <a:effectLst/>
+                          <a:latin typeface="Cambria Math" panose="02040503050406030204" pitchFamily="18" charset="0"/>
+                          <a:ea typeface="Calibri" panose="020F0502020204030204" pitchFamily="34" charset="0"/>
+                          <a:cs typeface="F"/>
+                        </a:rPr>
+                        <m:t>+</m:t>
+                      </m:r>
+                      <m:r>
+                        <m:rPr>
+                          <m:sty m:val="p"/>
+                        </m:rPr>
+                        <a:rPr lang="ru-RU" sz="1800">
+                          <a:effectLst/>
+                          <a:latin typeface="Cambria Math" panose="02040503050406030204" pitchFamily="18" charset="0"/>
+                          <a:ea typeface="Calibri" panose="020F0502020204030204" pitchFamily="34" charset="0"/>
+                          <a:cs typeface="F"/>
+                        </a:rPr>
+                        <m:t>OPT</m:t>
+                      </m:r>
+                      <m:r>
+                        <a:rPr lang="ru-RU" sz="1800">
+                          <a:effectLst/>
+                          <a:latin typeface="Cambria Math" panose="02040503050406030204" pitchFamily="18" charset="0"/>
+                          <a:ea typeface="Calibri" panose="020F0502020204030204" pitchFamily="34" charset="0"/>
+                          <a:cs typeface="F"/>
+                        </a:rPr>
+                        <m:t>(</m:t>
+                      </m:r>
+                      <m:sSub>
+                        <m:sSubPr>
+                          <m:ctrlPr>
+                            <a:rPr lang="ru-RU" i="1">
+                              <a:effectLst/>
+                              <a:latin typeface="Cambria Math" panose="02040503050406030204" pitchFamily="18" charset="0"/>
+                            </a:rPr>
+                          </m:ctrlPr>
+                        </m:sSubPr>
+                        <m:e>
+                          <m:r>
+                            <a:rPr lang="ru-RU" sz="1800" i="1">
+                              <a:effectLst/>
+                              <a:latin typeface="Cambria Math" panose="02040503050406030204" pitchFamily="18" charset="0"/>
+                              <a:ea typeface="Calibri" panose="020F0502020204030204" pitchFamily="34" charset="0"/>
+                              <a:cs typeface="F"/>
+                            </a:rPr>
+                            <m:t>𝒫</m:t>
+                          </m:r>
+                        </m:e>
+                        <m:sub>
+                          <m:r>
+                            <a:rPr lang="ru-RU" sz="1800" i="1">
+                              <a:effectLst/>
+                              <a:latin typeface="Cambria Math" panose="02040503050406030204" pitchFamily="18" charset="0"/>
+                              <a:ea typeface="Calibri" panose="020F0502020204030204" pitchFamily="34" charset="0"/>
+                              <a:cs typeface="F"/>
+                            </a:rPr>
+                            <m:t>𝑟𝑒𝑙</m:t>
+                          </m:r>
+                        </m:sub>
+                      </m:sSub>
+                      <m:r>
+                        <a:rPr lang="ru-RU" sz="1800">
+                          <a:effectLst/>
+                          <a:latin typeface="Cambria Math" panose="02040503050406030204" pitchFamily="18" charset="0"/>
+                          <a:ea typeface="Calibri" panose="020F0502020204030204" pitchFamily="34" charset="0"/>
+                          <a:cs typeface="F"/>
+                        </a:rPr>
+                        <m:t>)</m:t>
+                      </m:r>
+                    </m:oMath>
+                  </m:oMathPara>
+                </a14:m>
+                <a:endParaRPr lang="en-US" sz="1800" dirty="0">
+                  <a:effectLst/>
+                  <a:ea typeface="Calibri" panose="020F0502020204030204" pitchFamily="34" charset="0"/>
+                  <a:cs typeface="F"/>
+                </a:endParaRPr>
+              </a:p>
+              <a:p>
+                <a:endParaRPr lang="en-US" sz="1800" dirty="0">
+                  <a:effectLst/>
+                  <a:ea typeface="Calibri" panose="020F0502020204030204" pitchFamily="34" charset="0"/>
+                  <a:cs typeface="F"/>
+                </a:endParaRPr>
+              </a:p>
+              <a:p>
+                <a:pPr marL="342900" indent="-342900">
+                  <a:buFont typeface="+mj-lt"/>
+                  <a:buAutoNum type="arabicPeriod" startAt="2"/>
+                </a:pPr>
+                <a:r>
+                  <a:rPr lang="ru-RU" dirty="0"/>
+                  <a:t>Релаксация </a:t>
+                </a:r>
+                <a14:m>
+                  <m:oMath xmlns:m="http://schemas.openxmlformats.org/officeDocument/2006/math">
+                    <m:r>
+                      <a:rPr lang="ru-RU" sz="1800" i="1" smtClean="0">
+                        <a:effectLst/>
+                        <a:latin typeface="Cambria Math" panose="02040503050406030204" pitchFamily="18" charset="0"/>
+                        <a:ea typeface="Calibri" panose="020F0502020204030204" pitchFamily="34" charset="0"/>
+                        <a:cs typeface="F"/>
+                      </a:rPr>
+                      <m:t>𝒫</m:t>
+                    </m:r>
+                    <m:r>
+                      <m:rPr>
+                        <m:nor/>
+                      </m:rPr>
+                      <a:rPr lang="en-US" dirty="0">
+                        <a:sym typeface="Symbol" panose="05050102010706020507" pitchFamily="18" charset="2"/>
+                      </a:rPr>
+                      <m:t></m:t>
+                    </m:r>
+                  </m:oMath>
+                </a14:m>
+                <a:r>
+                  <a:rPr lang="en-US" dirty="0"/>
+                  <a:t> ATSP</a:t>
+                </a:r>
+              </a:p>
+              <a:p>
+                <a:pPr marL="800100" lvl="1" indent="-342900">
+                  <a:buFont typeface="Arial" panose="020B0604020202020204" pitchFamily="34" charset="0"/>
+                  <a:buChar char="•"/>
+                </a:pPr>
+                <a:r>
+                  <a:rPr lang="ru-RU" dirty="0" err="1"/>
+                  <a:t>Нун</a:t>
+                </a:r>
+                <a:r>
+                  <a:rPr lang="ru-RU" dirty="0"/>
+                  <a:t> и Бин</a:t>
+                </a:r>
+              </a:p>
+              <a:p>
+                <a:pPr marL="800100" lvl="1" indent="-342900">
+                  <a:buFont typeface="Arial" panose="020B0604020202020204" pitchFamily="34" charset="0"/>
+                  <a:buChar char="•"/>
+                </a:pPr>
+                <a:r>
+                  <a:rPr lang="ru-RU" dirty="0"/>
+                  <a:t>Граф кластеров </a:t>
+                </a:r>
+                <a14:m>
+                  <m:oMath xmlns:m="http://schemas.openxmlformats.org/officeDocument/2006/math">
+                    <m:sSub>
+                      <m:sSubPr>
+                        <m:ctrlPr>
+                          <a:rPr lang="ru-RU" i="1" smtClean="0">
+                            <a:effectLst/>
+                            <a:latin typeface="Cambria Math" panose="02040503050406030204" pitchFamily="18" charset="0"/>
+                            <a:cs typeface="Cambria Math" panose="02040503050406030204" pitchFamily="18" charset="0"/>
+                          </a:rPr>
+                        </m:ctrlPr>
+                      </m:sSubPr>
+                      <m:e>
+                        <m:r>
+                          <a:rPr lang="ru-RU" sz="1800" i="1">
+                            <a:effectLst/>
+                            <a:latin typeface="Cambria Math" panose="02040503050406030204" pitchFamily="18" charset="0"/>
+                            <a:ea typeface="Calibri" panose="020F0502020204030204" pitchFamily="34" charset="0"/>
+                            <a:cs typeface="Cambria Math" panose="02040503050406030204" pitchFamily="18" charset="0"/>
+                          </a:rPr>
+                          <m:t>𝐻</m:t>
+                        </m:r>
+                      </m:e>
+                      <m:sub>
+                        <m:r>
+                          <a:rPr lang="ru-RU" sz="1800" i="1">
+                            <a:effectLst/>
+                            <a:latin typeface="Cambria Math" panose="02040503050406030204" pitchFamily="18" charset="0"/>
+                            <a:ea typeface="Calibri" panose="020F0502020204030204" pitchFamily="34" charset="0"/>
+                            <a:cs typeface="Cambria Math" panose="02040503050406030204" pitchFamily="18" charset="0"/>
+                          </a:rPr>
+                          <m:t>1</m:t>
+                        </m:r>
+                      </m:sub>
+                    </m:sSub>
+                  </m:oMath>
+                </a14:m>
+                <a:endParaRPr lang="en-US" dirty="0"/>
+              </a:p>
+              <a:p>
+                <a:pPr marL="800100" lvl="1" indent="-342900">
+                  <a:buFont typeface="Arial" panose="020B0604020202020204" pitchFamily="34" charset="0"/>
+                  <a:buChar char="•"/>
+                </a:pPr>
+                <a:r>
+                  <a:rPr lang="ru-RU" dirty="0"/>
+                  <a:t>Граф кластеров </a:t>
+                </a:r>
+                <a14:m>
+                  <m:oMath xmlns:m="http://schemas.openxmlformats.org/officeDocument/2006/math">
+                    <m:sSub>
+                      <m:sSubPr>
+                        <m:ctrlPr>
+                          <a:rPr lang="ru-RU" i="1" smtClean="0">
+                            <a:effectLst/>
+                            <a:latin typeface="Cambria Math" panose="02040503050406030204" pitchFamily="18" charset="0"/>
+                            <a:cs typeface="Cambria Math" panose="02040503050406030204" pitchFamily="18" charset="0"/>
+                          </a:rPr>
+                        </m:ctrlPr>
+                      </m:sSubPr>
+                      <m:e>
+                        <m:r>
+                          <a:rPr lang="ru-RU" sz="1800" i="1">
+                            <a:effectLst/>
+                            <a:latin typeface="Cambria Math" panose="02040503050406030204" pitchFamily="18" charset="0"/>
+                            <a:ea typeface="Calibri" panose="020F0502020204030204" pitchFamily="34" charset="0"/>
+                            <a:cs typeface="Cambria Math" panose="02040503050406030204" pitchFamily="18" charset="0"/>
+                          </a:rPr>
+                          <m:t>𝐻</m:t>
+                        </m:r>
+                      </m:e>
+                      <m:sub>
+                        <m:r>
+                          <a:rPr lang="ru-RU" sz="1800" i="1">
+                            <a:effectLst/>
+                            <a:latin typeface="Cambria Math" panose="02040503050406030204" pitchFamily="18" charset="0"/>
+                            <a:ea typeface="Calibri" panose="020F0502020204030204" pitchFamily="34" charset="0"/>
+                            <a:cs typeface="Cambria Math" panose="02040503050406030204" pitchFamily="18" charset="0"/>
+                          </a:rPr>
+                          <m:t>2</m:t>
+                        </m:r>
+                      </m:sub>
+                    </m:sSub>
+                  </m:oMath>
+                </a14:m>
+                <a:endParaRPr lang="ru-RU" dirty="0"/>
+              </a:p>
+              <a:p>
+                <a:pPr marL="800100" lvl="1" indent="-342900">
+                  <a:buFont typeface="Arial" panose="020B0604020202020204" pitchFamily="34" charset="0"/>
+                  <a:buChar char="•"/>
+                </a:pPr>
+                <a:r>
+                  <a:rPr lang="ru-RU" dirty="0"/>
+                  <a:t>…</a:t>
+                </a:r>
+                <a:endParaRPr lang="en-US" dirty="0"/>
+              </a:p>
+              <a:p>
+                <a:pPr marL="800100" lvl="1" indent="-342900">
+                  <a:buFont typeface="Arial" panose="020B0604020202020204" pitchFamily="34" charset="0"/>
+                  <a:buChar char="•"/>
+                </a:pPr>
+                <a:endParaRPr lang="en-US" dirty="0"/>
+              </a:p>
+              <a:p>
+                <a:pPr marL="342900" indent="-342900">
+                  <a:buFont typeface="+mj-lt"/>
+                  <a:buAutoNum type="arabicPeriod" startAt="2"/>
+                </a:pPr>
+                <a:r>
+                  <a:rPr lang="ru-RU" dirty="0"/>
+                  <a:t>Релаксация </a:t>
+                </a:r>
+                <a:r>
+                  <a:rPr lang="en-US" dirty="0"/>
+                  <a:t>ATSP </a:t>
+                </a:r>
+                <a14:m>
+                  <m:oMath xmlns:m="http://schemas.openxmlformats.org/officeDocument/2006/math">
+                    <m:r>
+                      <m:rPr>
+                        <m:nor/>
+                      </m:rPr>
+                      <a:rPr lang="en-US" dirty="0" smtClean="0">
+                        <a:sym typeface="Symbol" panose="05050102010706020507" pitchFamily="18" charset="2"/>
+                      </a:rPr>
+                      <m:t></m:t>
+                    </m:r>
+                  </m:oMath>
+                </a14:m>
+                <a:r>
+                  <a:rPr lang="en-US" dirty="0"/>
+                  <a:t> </a:t>
+                </a:r>
+                <a14:m>
+                  <m:oMath xmlns:m="http://schemas.openxmlformats.org/officeDocument/2006/math">
+                    <m:r>
+                      <a:rPr lang="ru-RU" i="1"/>
+                      <m:t>𝐿𝐵</m:t>
+                    </m:r>
+                  </m:oMath>
+                </a14:m>
+                <a:endParaRPr lang="en-US" dirty="0"/>
+              </a:p>
+              <a:p>
+                <a:pPr marL="800100" lvl="1" indent="-342900">
+                  <a:buFont typeface="Arial" panose="020B0604020202020204" pitchFamily="34" charset="0"/>
+                  <a:buChar char="•"/>
+                </a:pPr>
+                <a:r>
+                  <a:rPr lang="en-US" dirty="0"/>
+                  <a:t>MSAP: </a:t>
+                </a:r>
+                <a:r>
+                  <a:rPr lang="ru-RU" dirty="0" err="1"/>
+                  <a:t>остовное</a:t>
+                </a:r>
+                <a:r>
+                  <a:rPr lang="ru-RU" dirty="0"/>
+                  <a:t> дерево</a:t>
+                </a:r>
+              </a:p>
+              <a:p>
+                <a:pPr marL="800100" lvl="1" indent="-342900">
+                  <a:buFont typeface="Arial" panose="020B0604020202020204" pitchFamily="34" charset="0"/>
+                  <a:buChar char="•"/>
+                </a:pPr>
+                <a:r>
+                  <a:rPr lang="en-US" dirty="0"/>
+                  <a:t>AP: </a:t>
+                </a:r>
+                <a:r>
+                  <a:rPr lang="ru-RU" dirty="0"/>
+                  <a:t>цикловое покрытие</a:t>
+                </a:r>
+              </a:p>
+              <a:p>
+                <a:pPr marL="800100" lvl="1" indent="-342900">
+                  <a:buFont typeface="Arial" panose="020B0604020202020204" pitchFamily="34" charset="0"/>
+                  <a:buChar char="•"/>
+                </a:pPr>
+                <a:r>
+                  <a:rPr lang="en-US" dirty="0" err="1"/>
+                  <a:t>Gurobi</a:t>
+                </a:r>
+                <a:r>
+                  <a:rPr lang="en-US" dirty="0"/>
+                  <a:t> + </a:t>
+                </a:r>
+                <a:r>
+                  <a:rPr lang="en-US" dirty="0" err="1"/>
+                  <a:t>ATSPxy</a:t>
+                </a:r>
+                <a:endParaRPr lang="ru-RU" dirty="0"/>
+              </a:p>
+              <a:p>
+                <a:pPr marL="800100" lvl="1" indent="-342900">
+                  <a:buFont typeface="Arial" panose="020B0604020202020204" pitchFamily="34" charset="0"/>
+                  <a:buChar char="•"/>
+                </a:pPr>
+                <a:r>
+                  <a:rPr lang="ru-RU" dirty="0"/>
+                  <a:t>…</a:t>
+                </a:r>
+              </a:p>
+            </p:txBody>
+          </p:sp>
+        </mc:Choice>
+        <mc:Fallback>
+          <p:sp>
+            <p:nvSpPr>
+              <p:cNvPr id="5" name="TextBox 4">
+                <a:extLst>
+                  <a:ext uri="{FF2B5EF4-FFF2-40B4-BE49-F238E27FC236}">
+                    <a16:creationId xmlns:a16="http://schemas.microsoft.com/office/drawing/2014/main" id="{E67035DC-3B0F-43AA-8041-0E7536B5DDB9}"/>
+                  </a:ext>
+                </a:extLst>
+              </p:cNvPr>
+              <p:cNvSpPr txBox="1">
+                <a:spLocks noRot="1" noChangeAspect="1" noMove="1" noResize="1" noEditPoints="1" noAdjustHandles="1" noChangeArrowheads="1" noChangeShapeType="1" noTextEdit="1"/>
+              </p:cNvSpPr>
+              <p:nvPr/>
+            </p:nvSpPr>
+            <p:spPr>
+              <a:xfrm>
+                <a:off x="318782" y="1476462"/>
+                <a:ext cx="5707311" cy="4524315"/>
+              </a:xfrm>
+              <a:prstGeom prst="rect">
+                <a:avLst/>
+              </a:prstGeom>
+              <a:blipFill>
+                <a:blip r:embed="rId2"/>
+                <a:stretch>
+                  <a:fillRect/>
+                </a:stretch>
+              </a:blipFill>
+              <a:ln>
+                <a:solidFill>
+                  <a:schemeClr val="tx1"/>
+                </a:solidFill>
+              </a:ln>
+              <a:effectLst>
+                <a:outerShdw blurRad="50800" dist="38100" dir="2700000" algn="tl" rotWithShape="0">
+                  <a:prstClr val="black">
+                    <a:alpha val="40000"/>
+                  </a:prstClr>
+                </a:outerShdw>
+              </a:effectLst>
+            </p:spPr>
+            <p:txBody>
+              <a:bodyPr/>
+              <a:lstStyle/>
+              <a:p>
+                <a:r>
+                  <a:rPr lang="ru-RU">
+                    <a:noFill/>
+                  </a:rPr>
+                  <a:t> </a:t>
+                </a:r>
+              </a:p>
+            </p:txBody>
+          </p:sp>
+        </mc:Fallback>
+      </mc:AlternateContent>
+      <mc:AlternateContent xmlns:mc="http://schemas.openxmlformats.org/markup-compatibility/2006">
+        <mc:Choice xmlns:a14="http://schemas.microsoft.com/office/drawing/2010/main" Requires="a14">
+          <p:sp>
+            <p:nvSpPr>
+              <p:cNvPr id="6" name="TextBox 5">
+                <a:extLst>
+                  <a:ext uri="{FF2B5EF4-FFF2-40B4-BE49-F238E27FC236}">
+                    <a16:creationId xmlns:a16="http://schemas.microsoft.com/office/drawing/2014/main" id="{47D7894A-BAE5-4F6E-9D9A-F4D5D3316F14}"/>
+                  </a:ext>
+                </a:extLst>
+              </p:cNvPr>
+              <p:cNvSpPr txBox="1"/>
+              <p:nvPr/>
+            </p:nvSpPr>
+            <p:spPr>
+              <a:xfrm>
+                <a:off x="6165908" y="1098958"/>
+                <a:ext cx="5847126" cy="2031325"/>
+              </a:xfrm>
+              <a:prstGeom prst="rect">
+                <a:avLst/>
+              </a:prstGeom>
+              <a:solidFill>
+                <a:schemeClr val="bg1"/>
+              </a:solidFill>
+              <a:ln>
+                <a:solidFill>
+                  <a:schemeClr val="tx1"/>
+                </a:solidFill>
+              </a:ln>
+              <a:effectLst>
+                <a:outerShdw blurRad="50800" dist="38100" dir="2700000" algn="tl" rotWithShape="0">
+                  <a:prstClr val="black">
+                    <a:alpha val="40000"/>
+                  </a:prstClr>
+                </a:outerShdw>
+              </a:effectLst>
+            </p:spPr>
+            <p:txBody>
+              <a:bodyPr wrap="square" rtlCol="0">
+                <a:spAutoFit/>
+              </a:bodyPr>
+              <a:lstStyle/>
+              <a:p>
+                <a:pPr algn="ctr"/>
+                <a:r>
+                  <a:rPr lang="ru-RU" b="1" dirty="0"/>
+                  <a:t>Стратегия отсечения</a:t>
+                </a:r>
+              </a:p>
+              <a:p>
+                <a:pPr algn="ctr"/>
+                <a:endParaRPr lang="ru-RU" b="1" dirty="0"/>
+              </a:p>
+              <a:p>
+                <a:pPr algn="ctr"/>
+                <a14:m>
+                  <m:oMathPara xmlns:m="http://schemas.openxmlformats.org/officeDocument/2006/math">
+                    <m:oMathParaPr>
+                      <m:jc m:val="centerGroup"/>
+                    </m:oMathParaPr>
+                    <m:oMath xmlns:m="http://schemas.openxmlformats.org/officeDocument/2006/math">
+                      <m:r>
+                        <a:rPr lang="ru-RU" sz="1800" i="1" smtClean="0">
+                          <a:effectLst/>
+                          <a:latin typeface="Cambria Math" panose="02040503050406030204" pitchFamily="18" charset="0"/>
+                          <a:ea typeface="Calibri" panose="020F0502020204030204" pitchFamily="34" charset="0"/>
+                          <a:cs typeface="F"/>
+                        </a:rPr>
+                        <m:t>𝐿𝐵</m:t>
+                      </m:r>
+                      <m:r>
+                        <a:rPr lang="ru-RU" sz="1800" i="1" smtClean="0">
+                          <a:effectLst/>
+                          <a:latin typeface="Cambria Math" panose="02040503050406030204" pitchFamily="18" charset="0"/>
+                          <a:ea typeface="Calibri" panose="020F0502020204030204" pitchFamily="34" charset="0"/>
+                          <a:cs typeface="F"/>
+                        </a:rPr>
+                        <m:t>&gt;</m:t>
+                      </m:r>
+                      <m:r>
+                        <a:rPr lang="ru-RU" sz="1800" i="1" smtClean="0">
+                          <a:effectLst/>
+                          <a:latin typeface="Cambria Math" panose="02040503050406030204" pitchFamily="18" charset="0"/>
+                          <a:ea typeface="Calibri" panose="020F0502020204030204" pitchFamily="34" charset="0"/>
+                          <a:cs typeface="F"/>
+                        </a:rPr>
+                        <m:t>𝑈𝐵</m:t>
+                      </m:r>
+                    </m:oMath>
+                  </m:oMathPara>
+                </a14:m>
+                <a:endParaRPr lang="ru-RU" b="1" dirty="0"/>
+              </a:p>
+              <a:p>
+                <a:pPr marL="285750" indent="-285750">
+                  <a:buFont typeface="Arial" panose="020B0604020202020204" pitchFamily="34" charset="0"/>
+                  <a:buChar char="•"/>
+                </a:pPr>
+                <a14:m>
+                  <m:oMath xmlns:m="http://schemas.openxmlformats.org/officeDocument/2006/math">
+                    <m:r>
+                      <a:rPr lang="ru-RU" sz="1800" i="1" smtClean="0">
+                        <a:effectLst/>
+                        <a:latin typeface="Cambria Math" panose="02040503050406030204" pitchFamily="18" charset="0"/>
+                        <a:ea typeface="Calibri" panose="020F0502020204030204" pitchFamily="34" charset="0"/>
+                        <a:cs typeface="F"/>
+                      </a:rPr>
+                      <m:t>𝐿𝐵</m:t>
+                    </m:r>
+                  </m:oMath>
+                </a14:m>
+                <a:r>
+                  <a:rPr lang="en-US" dirty="0"/>
+                  <a:t> – </a:t>
+                </a:r>
+                <a:r>
+                  <a:rPr lang="ru-RU" dirty="0"/>
+                  <a:t>нижняя оценка</a:t>
+                </a:r>
+              </a:p>
+              <a:p>
+                <a:pPr marL="285750" indent="-285750">
+                  <a:buFont typeface="Arial" panose="020B0604020202020204" pitchFamily="34" charset="0"/>
+                  <a:buChar char="•"/>
+                </a:pPr>
+                <a14:m>
+                  <m:oMath xmlns:m="http://schemas.openxmlformats.org/officeDocument/2006/math">
+                    <m:r>
+                      <a:rPr lang="ru-RU" sz="1800" i="1" smtClean="0">
+                        <a:effectLst/>
+                        <a:latin typeface="Cambria Math" panose="02040503050406030204" pitchFamily="18" charset="0"/>
+                        <a:ea typeface="Calibri" panose="020F0502020204030204" pitchFamily="34" charset="0"/>
+                        <a:cs typeface="F"/>
+                      </a:rPr>
+                      <m:t>𝑈𝐵</m:t>
+                    </m:r>
+                  </m:oMath>
+                </a14:m>
+                <a:r>
+                  <a:rPr lang="ru-RU" dirty="0"/>
+                  <a:t> – стоимость наилучшего найденного допустимого решения исходной задачи</a:t>
+                </a:r>
+              </a:p>
+              <a:p>
+                <a:pPr marL="742950" lvl="1" indent="-285750">
+                  <a:buFont typeface="Arial" panose="020B0604020202020204" pitchFamily="34" charset="0"/>
+                  <a:buChar char="•"/>
+                </a:pPr>
+                <a:r>
+                  <a:rPr lang="ru-RU" dirty="0"/>
+                  <a:t>Получается эвристикой </a:t>
+                </a:r>
+                <a:r>
+                  <a:rPr lang="en-US" dirty="0"/>
+                  <a:t>PCGLNS</a:t>
+                </a:r>
+                <a:endParaRPr lang="ru-RU" dirty="0"/>
+              </a:p>
+            </p:txBody>
+          </p:sp>
+        </mc:Choice>
+        <mc:Fallback>
+          <p:sp>
+            <p:nvSpPr>
+              <p:cNvPr id="6" name="TextBox 5">
+                <a:extLst>
+                  <a:ext uri="{FF2B5EF4-FFF2-40B4-BE49-F238E27FC236}">
+                    <a16:creationId xmlns:a16="http://schemas.microsoft.com/office/drawing/2014/main" id="{47D7894A-BAE5-4F6E-9D9A-F4D5D3316F14}"/>
+                  </a:ext>
+                </a:extLst>
+              </p:cNvPr>
+              <p:cNvSpPr txBox="1">
+                <a:spLocks noRot="1" noChangeAspect="1" noMove="1" noResize="1" noEditPoints="1" noAdjustHandles="1" noChangeArrowheads="1" noChangeShapeType="1" noTextEdit="1"/>
+              </p:cNvSpPr>
+              <p:nvPr/>
+            </p:nvSpPr>
+            <p:spPr>
+              <a:xfrm>
+                <a:off x="6165908" y="1098958"/>
+                <a:ext cx="5847126" cy="2031325"/>
+              </a:xfrm>
+              <a:prstGeom prst="rect">
+                <a:avLst/>
+              </a:prstGeom>
+              <a:blipFill>
+                <a:blip r:embed="rId3"/>
+                <a:stretch>
+                  <a:fillRect/>
+                </a:stretch>
+              </a:blipFill>
+              <a:ln>
+                <a:solidFill>
+                  <a:schemeClr val="tx1"/>
+                </a:solidFill>
+              </a:ln>
+              <a:effectLst>
+                <a:outerShdw blurRad="50800" dist="38100" dir="2700000" algn="tl" rotWithShape="0">
+                  <a:prstClr val="black">
+                    <a:alpha val="40000"/>
+                  </a:prstClr>
+                </a:outerShdw>
+              </a:effectLst>
+            </p:spPr>
+            <p:txBody>
+              <a:bodyPr/>
+              <a:lstStyle/>
+              <a:p>
+                <a:r>
+                  <a:rPr lang="ru-RU">
+                    <a:noFill/>
+                  </a:rPr>
+                  <a:t> </a:t>
+                </a:r>
+              </a:p>
+            </p:txBody>
+          </p:sp>
+        </mc:Fallback>
+      </mc:AlternateContent>
+      <mc:AlternateContent xmlns:mc="http://schemas.openxmlformats.org/markup-compatibility/2006">
+        <mc:Choice xmlns:a14="http://schemas.microsoft.com/office/drawing/2010/main" Requires="a14">
+          <p:sp>
+            <p:nvSpPr>
+              <p:cNvPr id="9" name="TextBox 8">
+                <a:extLst>
+                  <a:ext uri="{FF2B5EF4-FFF2-40B4-BE49-F238E27FC236}">
+                    <a16:creationId xmlns:a16="http://schemas.microsoft.com/office/drawing/2014/main" id="{83D75914-E56B-423F-B860-A82574DF027F}"/>
+                  </a:ext>
+                </a:extLst>
+              </p:cNvPr>
+              <p:cNvSpPr txBox="1"/>
+              <p:nvPr/>
+            </p:nvSpPr>
+            <p:spPr>
+              <a:xfrm>
+                <a:off x="6165908" y="3196205"/>
+                <a:ext cx="5847126" cy="3020314"/>
+              </a:xfrm>
+              <a:prstGeom prst="rect">
+                <a:avLst/>
+              </a:prstGeom>
+              <a:solidFill>
+                <a:schemeClr val="bg1"/>
+              </a:solidFill>
+              <a:ln>
+                <a:solidFill>
+                  <a:schemeClr val="tx1"/>
+                </a:solidFill>
+              </a:ln>
+              <a:effectLst>
+                <a:outerShdw blurRad="50800" dist="38100" dir="2700000" algn="tl" rotWithShape="0">
+                  <a:prstClr val="black">
+                    <a:alpha val="40000"/>
+                  </a:prstClr>
+                </a:outerShdw>
+              </a:effectLst>
+            </p:spPr>
+            <p:txBody>
+              <a:bodyPr wrap="square" rtlCol="0">
+                <a:spAutoFit/>
+              </a:bodyPr>
+              <a:lstStyle/>
+              <a:p>
+                <a:pPr algn="ctr"/>
+                <a:r>
+                  <a:rPr lang="ru-RU" b="1" dirty="0"/>
+                  <a:t>Стратегия ветвления</a:t>
+                </a:r>
+              </a:p>
+              <a:p>
+                <a:pPr algn="ctr"/>
+                <a:endParaRPr lang="ru-RU" b="1" dirty="0"/>
+              </a:p>
+              <a:p>
+                <a:pPr marL="285750" indent="-285750">
+                  <a:buFont typeface="Arial" panose="020B0604020202020204" pitchFamily="34" charset="0"/>
+                  <a:buChar char="•"/>
+                </a:pPr>
+                <a:r>
+                  <a:rPr lang="ru-RU" dirty="0"/>
+                  <a:t>Префикс </a:t>
+                </a:r>
+                <a14:m>
+                  <m:oMath xmlns:m="http://schemas.openxmlformats.org/officeDocument/2006/math">
+                    <m:r>
+                      <a:rPr lang="ru-RU" sz="1800" i="1" smtClean="0">
+                        <a:effectLst/>
+                        <a:latin typeface="Cambria Math" panose="02040503050406030204" pitchFamily="18" charset="0"/>
+                        <a:ea typeface="Calibri" panose="020F0502020204030204" pitchFamily="34" charset="0"/>
+                        <a:cs typeface="F"/>
+                      </a:rPr>
+                      <m:t>𝜎</m:t>
+                    </m:r>
+                    <m:r>
+                      <a:rPr lang="ru-RU" sz="1800" i="1" smtClean="0">
+                        <a:effectLst/>
+                        <a:latin typeface="Cambria Math" panose="02040503050406030204" pitchFamily="18" charset="0"/>
+                        <a:ea typeface="Calibri" panose="020F0502020204030204" pitchFamily="34" charset="0"/>
+                        <a:cs typeface="F"/>
+                      </a:rPr>
+                      <m:t>=(</m:t>
+                    </m:r>
+                    <m:sSub>
+                      <m:sSubPr>
+                        <m:ctrlPr>
+                          <a:rPr lang="ru-RU" i="1">
+                            <a:effectLst/>
+                            <a:latin typeface="Cambria Math" panose="02040503050406030204" pitchFamily="18" charset="0"/>
+                          </a:rPr>
+                        </m:ctrlPr>
+                      </m:sSubPr>
+                      <m:e>
+                        <m:r>
+                          <a:rPr lang="ru-RU" sz="1800" i="1">
+                            <a:effectLst/>
+                            <a:latin typeface="Cambria Math" panose="02040503050406030204" pitchFamily="18" charset="0"/>
+                            <a:ea typeface="Calibri" panose="020F0502020204030204" pitchFamily="34" charset="0"/>
+                            <a:cs typeface="F"/>
+                          </a:rPr>
+                          <m:t>𝑉</m:t>
+                        </m:r>
+                      </m:e>
+                      <m:sub>
+                        <m:sSub>
+                          <m:sSubPr>
+                            <m:ctrlPr>
+                              <a:rPr lang="ru-RU" i="1">
+                                <a:effectLst/>
+                                <a:latin typeface="Cambria Math" panose="02040503050406030204" pitchFamily="18" charset="0"/>
+                              </a:rPr>
+                            </m:ctrlPr>
+                          </m:sSubPr>
+                          <m:e>
+                            <m:r>
+                              <a:rPr lang="ru-RU" sz="1800" i="1">
+                                <a:effectLst/>
+                                <a:latin typeface="Cambria Math" panose="02040503050406030204" pitchFamily="18" charset="0"/>
+                                <a:ea typeface="Calibri" panose="020F0502020204030204" pitchFamily="34" charset="0"/>
+                                <a:cs typeface="F"/>
+                              </a:rPr>
+                              <m:t>𝑖</m:t>
+                            </m:r>
+                          </m:e>
+                          <m:sub>
+                            <m:r>
+                              <a:rPr lang="ru-RU" sz="1800" i="1">
+                                <a:effectLst/>
+                                <a:latin typeface="Cambria Math" panose="02040503050406030204" pitchFamily="18" charset="0"/>
+                                <a:ea typeface="Calibri" panose="020F0502020204030204" pitchFamily="34" charset="0"/>
+                                <a:cs typeface="F"/>
+                              </a:rPr>
+                              <m:t>1</m:t>
+                            </m:r>
+                          </m:sub>
+                        </m:sSub>
+                      </m:sub>
+                    </m:sSub>
+                    <m:r>
+                      <a:rPr lang="ru-RU" sz="1800" i="1">
+                        <a:effectLst/>
+                        <a:latin typeface="Cambria Math" panose="02040503050406030204" pitchFamily="18" charset="0"/>
+                        <a:ea typeface="Calibri" panose="020F0502020204030204" pitchFamily="34" charset="0"/>
+                        <a:cs typeface="F"/>
+                      </a:rPr>
+                      <m:t>,</m:t>
+                    </m:r>
+                    <m:sSub>
+                      <m:sSubPr>
+                        <m:ctrlPr>
+                          <a:rPr lang="ru-RU" i="1">
+                            <a:effectLst/>
+                            <a:latin typeface="Cambria Math" panose="02040503050406030204" pitchFamily="18" charset="0"/>
+                          </a:rPr>
+                        </m:ctrlPr>
+                      </m:sSubPr>
+                      <m:e>
+                        <m:r>
+                          <a:rPr lang="ru-RU" sz="1800" i="1">
+                            <a:effectLst/>
+                            <a:latin typeface="Cambria Math" panose="02040503050406030204" pitchFamily="18" charset="0"/>
+                            <a:ea typeface="Calibri" panose="020F0502020204030204" pitchFamily="34" charset="0"/>
+                            <a:cs typeface="F"/>
+                          </a:rPr>
+                          <m:t>𝑉</m:t>
+                        </m:r>
+                      </m:e>
+                      <m:sub>
+                        <m:sSub>
+                          <m:sSubPr>
+                            <m:ctrlPr>
+                              <a:rPr lang="ru-RU" i="1">
+                                <a:effectLst/>
+                                <a:latin typeface="Cambria Math" panose="02040503050406030204" pitchFamily="18" charset="0"/>
+                              </a:rPr>
+                            </m:ctrlPr>
+                          </m:sSubPr>
+                          <m:e>
+                            <m:r>
+                              <a:rPr lang="ru-RU" sz="1800" i="1">
+                                <a:effectLst/>
+                                <a:latin typeface="Cambria Math" panose="02040503050406030204" pitchFamily="18" charset="0"/>
+                                <a:ea typeface="Calibri" panose="020F0502020204030204" pitchFamily="34" charset="0"/>
+                                <a:cs typeface="F"/>
+                              </a:rPr>
+                              <m:t>𝑖</m:t>
+                            </m:r>
+                          </m:e>
+                          <m:sub>
+                            <m:r>
+                              <a:rPr lang="ru-RU" sz="1800" i="1">
+                                <a:effectLst/>
+                                <a:latin typeface="Cambria Math" panose="02040503050406030204" pitchFamily="18" charset="0"/>
+                                <a:ea typeface="Calibri" panose="020F0502020204030204" pitchFamily="34" charset="0"/>
+                                <a:cs typeface="F"/>
+                              </a:rPr>
+                              <m:t>2</m:t>
+                            </m:r>
+                          </m:sub>
+                        </m:sSub>
+                      </m:sub>
+                    </m:sSub>
+                    <m:r>
+                      <a:rPr lang="ru-RU" sz="1800" i="1">
+                        <a:effectLst/>
+                        <a:latin typeface="Cambria Math" panose="02040503050406030204" pitchFamily="18" charset="0"/>
+                        <a:ea typeface="Calibri" panose="020F0502020204030204" pitchFamily="34" charset="0"/>
+                        <a:cs typeface="F"/>
+                      </a:rPr>
+                      <m:t>,…</m:t>
+                    </m:r>
+                    <m:sSub>
+                      <m:sSubPr>
+                        <m:ctrlPr>
+                          <a:rPr lang="ru-RU" i="1">
+                            <a:effectLst/>
+                            <a:latin typeface="Cambria Math" panose="02040503050406030204" pitchFamily="18" charset="0"/>
+                          </a:rPr>
+                        </m:ctrlPr>
+                      </m:sSubPr>
+                      <m:e>
+                        <m:r>
+                          <a:rPr lang="ru-RU" sz="1800" i="1">
+                            <a:effectLst/>
+                            <a:latin typeface="Cambria Math" panose="02040503050406030204" pitchFamily="18" charset="0"/>
+                            <a:ea typeface="Calibri" panose="020F0502020204030204" pitchFamily="34" charset="0"/>
+                            <a:cs typeface="F"/>
+                          </a:rPr>
+                          <m:t>𝑉</m:t>
+                        </m:r>
+                      </m:e>
+                      <m:sub>
+                        <m:sSub>
+                          <m:sSubPr>
+                            <m:ctrlPr>
+                              <a:rPr lang="ru-RU" i="1">
+                                <a:effectLst/>
+                                <a:latin typeface="Cambria Math" panose="02040503050406030204" pitchFamily="18" charset="0"/>
+                              </a:rPr>
+                            </m:ctrlPr>
+                          </m:sSubPr>
+                          <m:e>
+                            <m:r>
+                              <a:rPr lang="ru-RU" sz="1800" i="1">
+                                <a:effectLst/>
+                                <a:latin typeface="Cambria Math" panose="02040503050406030204" pitchFamily="18" charset="0"/>
+                                <a:ea typeface="Calibri" panose="020F0502020204030204" pitchFamily="34" charset="0"/>
+                                <a:cs typeface="F"/>
+                              </a:rPr>
+                              <m:t>𝑖</m:t>
+                            </m:r>
+                          </m:e>
+                          <m:sub>
+                            <m:r>
+                              <a:rPr lang="ru-RU" sz="1800" i="1">
+                                <a:effectLst/>
+                                <a:latin typeface="Cambria Math" panose="02040503050406030204" pitchFamily="18" charset="0"/>
+                                <a:ea typeface="Calibri" panose="020F0502020204030204" pitchFamily="34" charset="0"/>
+                                <a:cs typeface="F"/>
+                              </a:rPr>
+                              <m:t>𝑟</m:t>
+                            </m:r>
+                          </m:sub>
+                        </m:sSub>
+                      </m:sub>
+                    </m:sSub>
+                    <m:r>
+                      <a:rPr lang="ru-RU" sz="1800" i="1">
+                        <a:effectLst/>
+                        <a:latin typeface="Cambria Math" panose="02040503050406030204" pitchFamily="18" charset="0"/>
+                        <a:ea typeface="Calibri" panose="020F0502020204030204" pitchFamily="34" charset="0"/>
+                        <a:cs typeface="F"/>
+                      </a:rPr>
+                      <m:t>)</m:t>
+                    </m:r>
+                  </m:oMath>
+                </a14:m>
+                <a:endParaRPr lang="ru-RU" dirty="0"/>
+              </a:p>
+              <a:p>
+                <a:pPr marL="285750" indent="-285750">
+                  <a:buFont typeface="Arial" panose="020B0604020202020204" pitchFamily="34" charset="0"/>
+                  <a:buChar char="•"/>
+                </a:pPr>
+                <a:r>
+                  <a:rPr lang="ru-RU" dirty="0"/>
+                  <a:t>Строим </a:t>
+                </a:r>
+                <a14:m>
+                  <m:oMath xmlns:m="http://schemas.openxmlformats.org/officeDocument/2006/math">
+                    <m:sSup>
+                      <m:sSupPr>
+                        <m:ctrlPr>
+                          <a:rPr lang="en-US" sz="1800" b="0" i="1" smtClean="0">
+                            <a:effectLst/>
+                            <a:latin typeface="Cambria Math" panose="02040503050406030204" pitchFamily="18" charset="0"/>
+                            <a:ea typeface="Calibri" panose="020F0502020204030204" pitchFamily="34" charset="0"/>
+                            <a:cs typeface="F"/>
+                          </a:rPr>
+                        </m:ctrlPr>
+                      </m:sSupPr>
+                      <m:e>
+                        <m:r>
+                          <a:rPr lang="ru-RU" sz="1800" i="1" smtClean="0">
+                            <a:effectLst/>
+                            <a:latin typeface="Cambria Math" panose="02040503050406030204" pitchFamily="18" charset="0"/>
+                            <a:ea typeface="Calibri" panose="020F0502020204030204" pitchFamily="34" charset="0"/>
+                            <a:cs typeface="F"/>
+                          </a:rPr>
+                          <m:t>𝜎</m:t>
+                        </m:r>
+                      </m:e>
+                      <m:sup>
+                        <m:r>
+                          <a:rPr lang="en-US" sz="1800" b="0" i="1" smtClean="0">
+                            <a:effectLst/>
+                            <a:latin typeface="Cambria Math" panose="02040503050406030204" pitchFamily="18" charset="0"/>
+                            <a:ea typeface="Calibri" panose="020F0502020204030204" pitchFamily="34" charset="0"/>
+                            <a:cs typeface="F"/>
+                          </a:rPr>
+                          <m:t>′</m:t>
+                        </m:r>
+                      </m:sup>
+                    </m:sSup>
+                    <m:r>
+                      <a:rPr lang="ru-RU" sz="1800" i="1" smtClean="0">
+                        <a:effectLst/>
+                        <a:latin typeface="Cambria Math" panose="02040503050406030204" pitchFamily="18" charset="0"/>
+                        <a:ea typeface="Calibri" panose="020F0502020204030204" pitchFamily="34" charset="0"/>
+                        <a:cs typeface="F"/>
+                      </a:rPr>
+                      <m:t>=</m:t>
+                    </m:r>
+                    <m:d>
+                      <m:dPr>
+                        <m:ctrlPr>
+                          <a:rPr lang="ru-RU" sz="1800" b="0" i="1" smtClean="0">
+                            <a:effectLst/>
+                            <a:latin typeface="Cambria Math" panose="02040503050406030204" pitchFamily="18" charset="0"/>
+                            <a:ea typeface="Calibri" panose="020F0502020204030204" pitchFamily="34" charset="0"/>
+                            <a:cs typeface="F"/>
+                          </a:rPr>
+                        </m:ctrlPr>
+                      </m:dPr>
+                      <m:e>
+                        <m:sSub>
+                          <m:sSubPr>
+                            <m:ctrlPr>
+                              <a:rPr lang="ru-RU" i="1">
+                                <a:effectLst/>
+                                <a:latin typeface="Cambria Math" panose="02040503050406030204" pitchFamily="18" charset="0"/>
+                              </a:rPr>
+                            </m:ctrlPr>
+                          </m:sSubPr>
+                          <m:e>
+                            <m:r>
+                              <a:rPr lang="ru-RU" sz="1800" i="1">
+                                <a:effectLst/>
+                                <a:latin typeface="Cambria Math" panose="02040503050406030204" pitchFamily="18" charset="0"/>
+                                <a:ea typeface="Calibri" panose="020F0502020204030204" pitchFamily="34" charset="0"/>
+                                <a:cs typeface="F"/>
+                              </a:rPr>
+                              <m:t>𝑉</m:t>
+                            </m:r>
+                          </m:e>
+                          <m:sub>
+                            <m:sSub>
+                              <m:sSubPr>
+                                <m:ctrlPr>
+                                  <a:rPr lang="ru-RU" i="1">
+                                    <a:effectLst/>
+                                    <a:latin typeface="Cambria Math" panose="02040503050406030204" pitchFamily="18" charset="0"/>
+                                  </a:rPr>
+                                </m:ctrlPr>
+                              </m:sSubPr>
+                              <m:e>
+                                <m:r>
+                                  <a:rPr lang="ru-RU" sz="1800" i="1">
+                                    <a:effectLst/>
+                                    <a:latin typeface="Cambria Math" panose="02040503050406030204" pitchFamily="18" charset="0"/>
+                                    <a:ea typeface="Calibri" panose="020F0502020204030204" pitchFamily="34" charset="0"/>
+                                    <a:cs typeface="F"/>
+                                  </a:rPr>
+                                  <m:t>𝑖</m:t>
+                                </m:r>
+                              </m:e>
+                              <m:sub>
+                                <m:r>
+                                  <a:rPr lang="ru-RU" sz="1800" i="1">
+                                    <a:effectLst/>
+                                    <a:latin typeface="Cambria Math" panose="02040503050406030204" pitchFamily="18" charset="0"/>
+                                    <a:ea typeface="Calibri" panose="020F0502020204030204" pitchFamily="34" charset="0"/>
+                                    <a:cs typeface="F"/>
+                                  </a:rPr>
+                                  <m:t>1</m:t>
+                                </m:r>
+                              </m:sub>
+                            </m:sSub>
+                          </m:sub>
+                        </m:sSub>
+                        <m:r>
+                          <a:rPr lang="ru-RU" sz="1800" i="1">
+                            <a:effectLst/>
+                            <a:latin typeface="Cambria Math" panose="02040503050406030204" pitchFamily="18" charset="0"/>
+                            <a:ea typeface="Calibri" panose="020F0502020204030204" pitchFamily="34" charset="0"/>
+                            <a:cs typeface="F"/>
+                          </a:rPr>
+                          <m:t>,</m:t>
+                        </m:r>
+                        <m:sSub>
+                          <m:sSubPr>
+                            <m:ctrlPr>
+                              <a:rPr lang="ru-RU" i="1">
+                                <a:effectLst/>
+                                <a:latin typeface="Cambria Math" panose="02040503050406030204" pitchFamily="18" charset="0"/>
+                              </a:rPr>
+                            </m:ctrlPr>
+                          </m:sSubPr>
+                          <m:e>
+                            <m:r>
+                              <a:rPr lang="ru-RU" sz="1800" i="1">
+                                <a:effectLst/>
+                                <a:latin typeface="Cambria Math" panose="02040503050406030204" pitchFamily="18" charset="0"/>
+                                <a:ea typeface="Calibri" panose="020F0502020204030204" pitchFamily="34" charset="0"/>
+                                <a:cs typeface="F"/>
+                              </a:rPr>
+                              <m:t>𝑉</m:t>
+                            </m:r>
+                          </m:e>
+                          <m:sub>
+                            <m:sSub>
+                              <m:sSubPr>
+                                <m:ctrlPr>
+                                  <a:rPr lang="ru-RU" i="1">
+                                    <a:effectLst/>
+                                    <a:latin typeface="Cambria Math" panose="02040503050406030204" pitchFamily="18" charset="0"/>
+                                  </a:rPr>
+                                </m:ctrlPr>
+                              </m:sSubPr>
+                              <m:e>
+                                <m:r>
+                                  <a:rPr lang="ru-RU" sz="1800" i="1">
+                                    <a:effectLst/>
+                                    <a:latin typeface="Cambria Math" panose="02040503050406030204" pitchFamily="18" charset="0"/>
+                                    <a:ea typeface="Calibri" panose="020F0502020204030204" pitchFamily="34" charset="0"/>
+                                    <a:cs typeface="F"/>
+                                  </a:rPr>
+                                  <m:t>𝑖</m:t>
+                                </m:r>
+                              </m:e>
+                              <m:sub>
+                                <m:r>
+                                  <a:rPr lang="ru-RU" sz="1800" i="1">
+                                    <a:effectLst/>
+                                    <a:latin typeface="Cambria Math" panose="02040503050406030204" pitchFamily="18" charset="0"/>
+                                    <a:ea typeface="Calibri" panose="020F0502020204030204" pitchFamily="34" charset="0"/>
+                                    <a:cs typeface="F"/>
+                                  </a:rPr>
+                                  <m:t>2</m:t>
+                                </m:r>
+                              </m:sub>
+                            </m:sSub>
+                          </m:sub>
+                        </m:sSub>
+                        <m:r>
+                          <a:rPr lang="ru-RU" sz="1800" i="1">
+                            <a:effectLst/>
+                            <a:latin typeface="Cambria Math" panose="02040503050406030204" pitchFamily="18" charset="0"/>
+                            <a:ea typeface="Calibri" panose="020F0502020204030204" pitchFamily="34" charset="0"/>
+                            <a:cs typeface="F"/>
+                          </a:rPr>
+                          <m:t>,…</m:t>
+                        </m:r>
+                        <m:sSub>
+                          <m:sSubPr>
+                            <m:ctrlPr>
+                              <a:rPr lang="ru-RU" i="1">
+                                <a:effectLst/>
+                                <a:latin typeface="Cambria Math" panose="02040503050406030204" pitchFamily="18" charset="0"/>
+                              </a:rPr>
+                            </m:ctrlPr>
+                          </m:sSubPr>
+                          <m:e>
+                            <m:r>
+                              <a:rPr lang="ru-RU" sz="1800" i="1">
+                                <a:effectLst/>
+                                <a:latin typeface="Cambria Math" panose="02040503050406030204" pitchFamily="18" charset="0"/>
+                                <a:ea typeface="Calibri" panose="020F0502020204030204" pitchFamily="34" charset="0"/>
+                                <a:cs typeface="F"/>
+                              </a:rPr>
+                              <m:t>𝑉</m:t>
+                            </m:r>
+                          </m:e>
+                          <m:sub>
+                            <m:sSub>
+                              <m:sSubPr>
+                                <m:ctrlPr>
+                                  <a:rPr lang="ru-RU" i="1">
+                                    <a:effectLst/>
+                                    <a:latin typeface="Cambria Math" panose="02040503050406030204" pitchFamily="18" charset="0"/>
+                                  </a:rPr>
+                                </m:ctrlPr>
+                              </m:sSubPr>
+                              <m:e>
+                                <m:r>
+                                  <a:rPr lang="ru-RU" sz="1800" i="1">
+                                    <a:effectLst/>
+                                    <a:latin typeface="Cambria Math" panose="02040503050406030204" pitchFamily="18" charset="0"/>
+                                    <a:ea typeface="Calibri" panose="020F0502020204030204" pitchFamily="34" charset="0"/>
+                                    <a:cs typeface="F"/>
+                                  </a:rPr>
+                                  <m:t>𝑖</m:t>
+                                </m:r>
+                              </m:e>
+                              <m:sub>
+                                <m:r>
+                                  <a:rPr lang="ru-RU" sz="1800" i="1">
+                                    <a:effectLst/>
+                                    <a:latin typeface="Cambria Math" panose="02040503050406030204" pitchFamily="18" charset="0"/>
+                                    <a:ea typeface="Calibri" panose="020F0502020204030204" pitchFamily="34" charset="0"/>
+                                    <a:cs typeface="F"/>
+                                  </a:rPr>
+                                  <m:t>𝑟</m:t>
+                                </m:r>
+                              </m:sub>
+                            </m:sSub>
+                          </m:sub>
+                        </m:sSub>
+                        <m:r>
+                          <a:rPr lang="en-US" sz="1800" b="0" i="1" smtClean="0">
+                            <a:effectLst/>
+                            <a:latin typeface="Cambria Math" panose="02040503050406030204" pitchFamily="18" charset="0"/>
+                            <a:ea typeface="Calibri" panose="020F0502020204030204" pitchFamily="34" charset="0"/>
+                            <a:cs typeface="F"/>
+                          </a:rPr>
+                          <m:t>,</m:t>
+                        </m:r>
+                        <m:sSup>
+                          <m:sSupPr>
+                            <m:ctrlPr>
+                              <a:rPr lang="ru-RU" i="1"/>
+                            </m:ctrlPr>
+                          </m:sSupPr>
+                          <m:e>
+                            <m:r>
+                              <a:rPr lang="ru-RU" i="1"/>
+                              <m:t>𝑉</m:t>
+                            </m:r>
+                          </m:e>
+                          <m:sup>
+                            <m:r>
+                              <a:rPr lang="ru-RU" i="1"/>
+                              <m:t>+</m:t>
+                            </m:r>
+                          </m:sup>
+                        </m:sSup>
+                      </m:e>
+                    </m:d>
+                  </m:oMath>
+                </a14:m>
+                <a:endParaRPr lang="en-US" sz="1800" dirty="0">
+                  <a:effectLst/>
+                  <a:ea typeface="Calibri" panose="020F0502020204030204" pitchFamily="34" charset="0"/>
+                  <a:cs typeface="F"/>
+                </a:endParaRPr>
+              </a:p>
+              <a:p>
+                <a:pPr marL="285750" indent="-285750">
+                  <a:buFont typeface="Arial" panose="020B0604020202020204" pitchFamily="34" charset="0"/>
+                  <a:buChar char="•"/>
+                </a:pPr>
+                <a:r>
+                  <a:rPr lang="ru-RU" dirty="0"/>
+                  <a:t>Используем ограничения предшествования:</a:t>
+                </a:r>
+                <a:endParaRPr lang="en-US" dirty="0"/>
+              </a:p>
+              <a:p>
+                <a:pPr marL="742950" lvl="1" indent="-285750">
+                  <a:buFont typeface="Arial" panose="020B0604020202020204" pitchFamily="34" charset="0"/>
+                  <a:buChar char="•"/>
+                </a:pPr>
+                <a14:m>
+                  <m:oMath xmlns:m="http://schemas.openxmlformats.org/officeDocument/2006/math">
+                    <m:sSup>
+                      <m:sSupPr>
+                        <m:ctrlPr>
+                          <a:rPr lang="ru-RU" i="1" smtClean="0">
+                            <a:effectLst/>
+                            <a:latin typeface="Cambria Math" panose="02040503050406030204" pitchFamily="18" charset="0"/>
+                          </a:rPr>
+                        </m:ctrlPr>
+                      </m:sSupPr>
+                      <m:e>
+                        <m:r>
+                          <a:rPr lang="ru-RU" sz="1800" i="1">
+                            <a:effectLst/>
+                            <a:latin typeface="Cambria Math" panose="02040503050406030204" pitchFamily="18" charset="0"/>
+                            <a:ea typeface="Calibri" panose="020F0502020204030204" pitchFamily="34" charset="0"/>
+                            <a:cs typeface="Times New Roman" panose="02020603050405020304" pitchFamily="18" charset="0"/>
+                          </a:rPr>
+                          <m:t>𝑉</m:t>
+                        </m:r>
+                      </m:e>
+                      <m:sup>
+                        <m:r>
+                          <a:rPr lang="ru-RU" sz="1800" i="1">
+                            <a:effectLst/>
+                            <a:latin typeface="Cambria Math" panose="02040503050406030204" pitchFamily="18" charset="0"/>
+                            <a:ea typeface="Calibri" panose="020F0502020204030204" pitchFamily="34" charset="0"/>
+                            <a:cs typeface="Times New Roman" panose="02020603050405020304" pitchFamily="18" charset="0"/>
+                          </a:rPr>
+                          <m:t>+</m:t>
+                        </m:r>
+                      </m:sup>
+                    </m:sSup>
+                    <m:r>
+                      <a:rPr lang="ru-RU" sz="1800">
+                        <a:effectLst/>
+                        <a:latin typeface="Cambria Math" panose="02040503050406030204" pitchFamily="18" charset="0"/>
+                        <a:ea typeface="Calibri" panose="020F0502020204030204" pitchFamily="34" charset="0"/>
+                        <a:cs typeface="Times New Roman" panose="02020603050405020304" pitchFamily="18" charset="0"/>
+                      </a:rPr>
+                      <m:t>∉</m:t>
+                    </m:r>
+                    <m:r>
+                      <a:rPr lang="ru-RU" sz="1800" i="1">
+                        <a:effectLst/>
+                        <a:latin typeface="Cambria Math" panose="02040503050406030204" pitchFamily="18" charset="0"/>
+                        <a:ea typeface="Calibri" panose="020F0502020204030204" pitchFamily="34" charset="0"/>
+                        <a:cs typeface="Times New Roman" panose="02020603050405020304" pitchFamily="18" charset="0"/>
+                      </a:rPr>
+                      <m:t>𝜎</m:t>
+                    </m:r>
+                  </m:oMath>
+                </a14:m>
+                <a:endParaRPr lang="en-US" dirty="0"/>
+              </a:p>
+              <a:p>
+                <a:pPr marL="742950" lvl="1" indent="-285750">
+                  <a:buFont typeface="Arial" panose="020B0604020202020204" pitchFamily="34" charset="0"/>
+                  <a:buChar char="•"/>
+                </a:pPr>
+                <a14:m>
+                  <m:oMath xmlns:m="http://schemas.openxmlformats.org/officeDocument/2006/math">
+                    <m:r>
+                      <a:rPr lang="ru-RU" sz="1800" smtClean="0">
+                        <a:effectLst/>
+                        <a:latin typeface="Cambria Math" panose="02040503050406030204" pitchFamily="18" charset="0"/>
+                        <a:ea typeface="Calibri" panose="020F0502020204030204" pitchFamily="34" charset="0"/>
+                        <a:cs typeface="Times New Roman" panose="02020603050405020304" pitchFamily="18" charset="0"/>
+                      </a:rPr>
+                      <m:t>∀</m:t>
+                    </m:r>
+                    <m:sSub>
+                      <m:sSubPr>
+                        <m:ctrlPr>
+                          <a:rPr lang="ru-RU" i="1">
+                            <a:effectLst/>
+                            <a:latin typeface="Cambria Math" panose="02040503050406030204" pitchFamily="18" charset="0"/>
+                          </a:rPr>
+                        </m:ctrlPr>
+                      </m:sSubPr>
+                      <m:e>
+                        <m:r>
+                          <a:rPr lang="ru-RU" sz="1800" i="1">
+                            <a:effectLst/>
+                            <a:latin typeface="Cambria Math" panose="02040503050406030204" pitchFamily="18" charset="0"/>
+                            <a:ea typeface="Calibri" panose="020F0502020204030204" pitchFamily="34" charset="0"/>
+                            <a:cs typeface="Times New Roman" panose="02020603050405020304" pitchFamily="18" charset="0"/>
+                          </a:rPr>
+                          <m:t>𝑉</m:t>
+                        </m:r>
+                      </m:e>
+                      <m:sub>
+                        <m:sSub>
+                          <m:sSubPr>
+                            <m:ctrlPr>
+                              <a:rPr lang="ru-RU" i="1">
+                                <a:effectLst/>
+                                <a:latin typeface="Cambria Math" panose="02040503050406030204" pitchFamily="18" charset="0"/>
+                              </a:rPr>
+                            </m:ctrlPr>
+                          </m:sSubPr>
+                          <m:e>
+                            <m:r>
+                              <a:rPr lang="ru-RU" sz="1800" i="1">
+                                <a:effectLst/>
+                                <a:latin typeface="Cambria Math" panose="02040503050406030204" pitchFamily="18" charset="0"/>
+                                <a:ea typeface="Calibri" panose="020F0502020204030204" pitchFamily="34" charset="0"/>
+                                <a:cs typeface="Times New Roman" panose="02020603050405020304" pitchFamily="18" charset="0"/>
+                              </a:rPr>
+                              <m:t>𝑖</m:t>
+                            </m:r>
+                          </m:e>
+                          <m:sub>
+                            <m:r>
+                              <a:rPr lang="ru-RU" sz="1800" i="1">
+                                <a:effectLst/>
+                                <a:latin typeface="Cambria Math" panose="02040503050406030204" pitchFamily="18" charset="0"/>
+                                <a:ea typeface="Calibri" panose="020F0502020204030204" pitchFamily="34" charset="0"/>
+                                <a:cs typeface="Times New Roman" panose="02020603050405020304" pitchFamily="18" charset="0"/>
+                              </a:rPr>
+                              <m:t>𝑗</m:t>
+                            </m:r>
+                          </m:sub>
+                        </m:sSub>
+                      </m:sub>
+                    </m:sSub>
+                    <m:r>
+                      <a:rPr lang="ru-RU" sz="1800" i="1">
+                        <a:effectLst/>
+                        <a:latin typeface="Cambria Math" panose="02040503050406030204" pitchFamily="18" charset="0"/>
+                        <a:ea typeface="Calibri" panose="020F0502020204030204" pitchFamily="34" charset="0"/>
+                        <a:cs typeface="Times New Roman" panose="02020603050405020304" pitchFamily="18" charset="0"/>
+                      </a:rPr>
+                      <m:t>∈</m:t>
+                    </m:r>
+                    <m:r>
+                      <a:rPr lang="ru-RU" sz="1800" i="1">
+                        <a:effectLst/>
+                        <a:latin typeface="Cambria Math" panose="02040503050406030204" pitchFamily="18" charset="0"/>
+                        <a:ea typeface="Calibri" panose="020F0502020204030204" pitchFamily="34" charset="0"/>
+                        <a:cs typeface="Times New Roman" panose="02020603050405020304" pitchFamily="18" charset="0"/>
+                      </a:rPr>
+                      <m:t>𝜎</m:t>
+                    </m:r>
+                    <m:r>
+                      <a:rPr lang="ru-RU" sz="1800" i="1">
+                        <a:effectLst/>
+                        <a:latin typeface="Cambria Math" panose="02040503050406030204" pitchFamily="18" charset="0"/>
+                        <a:ea typeface="Calibri" panose="020F0502020204030204" pitchFamily="34" charset="0"/>
+                        <a:cs typeface="Times New Roman" panose="02020603050405020304" pitchFamily="18" charset="0"/>
+                      </a:rPr>
+                      <m:t>:(</m:t>
+                    </m:r>
+                    <m:sSup>
+                      <m:sSupPr>
+                        <m:ctrlPr>
+                          <a:rPr lang="ru-RU" i="1">
+                            <a:effectLst/>
+                            <a:latin typeface="Cambria Math" panose="02040503050406030204" pitchFamily="18" charset="0"/>
+                          </a:rPr>
+                        </m:ctrlPr>
+                      </m:sSupPr>
+                      <m:e>
+                        <m:r>
+                          <a:rPr lang="ru-RU" sz="1800" i="1">
+                            <a:effectLst/>
+                            <a:latin typeface="Cambria Math" panose="02040503050406030204" pitchFamily="18" charset="0"/>
+                            <a:ea typeface="Calibri" panose="020F0502020204030204" pitchFamily="34" charset="0"/>
+                            <a:cs typeface="Times New Roman" panose="02020603050405020304" pitchFamily="18" charset="0"/>
+                          </a:rPr>
+                          <m:t>𝑉</m:t>
+                        </m:r>
+                      </m:e>
+                      <m:sup>
+                        <m:r>
+                          <a:rPr lang="ru-RU" sz="1800" i="1">
+                            <a:effectLst/>
+                            <a:latin typeface="Cambria Math" panose="02040503050406030204" pitchFamily="18" charset="0"/>
+                            <a:ea typeface="Calibri" panose="020F0502020204030204" pitchFamily="34" charset="0"/>
+                            <a:cs typeface="Times New Roman" panose="02020603050405020304" pitchFamily="18" charset="0"/>
+                          </a:rPr>
+                          <m:t>+</m:t>
+                        </m:r>
+                      </m:sup>
+                    </m:sSup>
+                    <m:r>
+                      <a:rPr lang="ru-RU" sz="1800" i="1">
+                        <a:effectLst/>
+                        <a:latin typeface="Cambria Math" panose="02040503050406030204" pitchFamily="18" charset="0"/>
+                        <a:ea typeface="Calibri" panose="020F0502020204030204" pitchFamily="34" charset="0"/>
+                        <a:cs typeface="Times New Roman" panose="02020603050405020304" pitchFamily="18" charset="0"/>
+                      </a:rPr>
+                      <m:t>,</m:t>
+                    </m:r>
+                    <m:sSub>
+                      <m:sSubPr>
+                        <m:ctrlPr>
+                          <a:rPr lang="ru-RU" i="1">
+                            <a:effectLst/>
+                            <a:latin typeface="Cambria Math" panose="02040503050406030204" pitchFamily="18" charset="0"/>
+                          </a:rPr>
+                        </m:ctrlPr>
+                      </m:sSubPr>
+                      <m:e>
+                        <m:r>
+                          <a:rPr lang="ru-RU" sz="1800" i="1">
+                            <a:effectLst/>
+                            <a:latin typeface="Cambria Math" panose="02040503050406030204" pitchFamily="18" charset="0"/>
+                            <a:ea typeface="Calibri" panose="020F0502020204030204" pitchFamily="34" charset="0"/>
+                            <a:cs typeface="Times New Roman" panose="02020603050405020304" pitchFamily="18" charset="0"/>
+                          </a:rPr>
+                          <m:t>𝑉</m:t>
+                        </m:r>
+                      </m:e>
+                      <m:sub>
+                        <m:sSub>
+                          <m:sSubPr>
+                            <m:ctrlPr>
+                              <a:rPr lang="ru-RU" i="1">
+                                <a:effectLst/>
+                                <a:latin typeface="Cambria Math" panose="02040503050406030204" pitchFamily="18" charset="0"/>
+                              </a:rPr>
+                            </m:ctrlPr>
+                          </m:sSubPr>
+                          <m:e>
+                            <m:r>
+                              <a:rPr lang="ru-RU" sz="1800" i="1">
+                                <a:effectLst/>
+                                <a:latin typeface="Cambria Math" panose="02040503050406030204" pitchFamily="18" charset="0"/>
+                                <a:ea typeface="Calibri" panose="020F0502020204030204" pitchFamily="34" charset="0"/>
+                                <a:cs typeface="Times New Roman" panose="02020603050405020304" pitchFamily="18" charset="0"/>
+                              </a:rPr>
+                              <m:t>𝑖</m:t>
+                            </m:r>
+                          </m:e>
+                          <m:sub>
+                            <m:r>
+                              <a:rPr lang="ru-RU" sz="1800" i="1">
+                                <a:effectLst/>
+                                <a:latin typeface="Cambria Math" panose="02040503050406030204" pitchFamily="18" charset="0"/>
+                                <a:ea typeface="Calibri" panose="020F0502020204030204" pitchFamily="34" charset="0"/>
+                                <a:cs typeface="Times New Roman" panose="02020603050405020304" pitchFamily="18" charset="0"/>
+                              </a:rPr>
+                              <m:t>𝑗</m:t>
+                            </m:r>
+                          </m:sub>
+                        </m:sSub>
+                      </m:sub>
+                    </m:sSub>
+                    <m:r>
+                      <a:rPr lang="ru-RU" sz="1800" i="1">
+                        <a:effectLst/>
+                        <a:latin typeface="Cambria Math" panose="02040503050406030204" pitchFamily="18" charset="0"/>
+                        <a:ea typeface="Calibri" panose="020F0502020204030204" pitchFamily="34" charset="0"/>
+                        <a:cs typeface="Times New Roman" panose="02020603050405020304" pitchFamily="18" charset="0"/>
+                      </a:rPr>
+                      <m:t>)</m:t>
+                    </m:r>
+                    <m:r>
+                      <a:rPr lang="ru-RU" sz="1800">
+                        <a:effectLst/>
+                        <a:latin typeface="Cambria Math" panose="02040503050406030204" pitchFamily="18" charset="0"/>
+                        <a:ea typeface="Calibri" panose="020F0502020204030204" pitchFamily="34" charset="0"/>
+                        <a:cs typeface="Times New Roman" panose="02020603050405020304" pitchFamily="18" charset="0"/>
+                      </a:rPr>
+                      <m:t>∉</m:t>
+                    </m:r>
+                    <m:r>
+                      <a:rPr lang="ru-RU" sz="1800" i="1">
+                        <a:effectLst/>
+                        <a:latin typeface="Cambria Math" panose="02040503050406030204" pitchFamily="18" charset="0"/>
+                        <a:ea typeface="Calibri" panose="020F0502020204030204" pitchFamily="34" charset="0"/>
+                        <a:cs typeface="Times New Roman" panose="02020603050405020304" pitchFamily="18" charset="0"/>
+                      </a:rPr>
+                      <m:t>𝐴</m:t>
+                    </m:r>
+                  </m:oMath>
+                </a14:m>
+                <a:endParaRPr lang="en-US" dirty="0"/>
+              </a:p>
+              <a:p>
+                <a:pPr marL="742950" lvl="1" indent="-285750">
+                  <a:buFont typeface="Arial" panose="020B0604020202020204" pitchFamily="34" charset="0"/>
+                  <a:buChar char="•"/>
+                </a:pPr>
+                <a:r>
+                  <a:rPr lang="ru-RU" dirty="0"/>
+                  <a:t>Дополнительно:</a:t>
+                </a:r>
+                <a14:m>
+                  <m:oMath xmlns:m="http://schemas.openxmlformats.org/officeDocument/2006/math">
+                    <m:d>
+                      <m:dPr>
+                        <m:ctrlPr>
+                          <a:rPr lang="ru-RU" i="1">
+                            <a:latin typeface="Cambria Math" panose="02040503050406030204" pitchFamily="18" charset="0"/>
+                          </a:rPr>
+                        </m:ctrlPr>
+                      </m:dPr>
+                      <m:e>
+                        <m:acc>
+                          <m:accPr>
+                            <m:chr m:val="̃"/>
+                            <m:ctrlPr>
+                              <a:rPr lang="ru-RU" i="1"/>
+                            </m:ctrlPr>
+                          </m:accPr>
+                          <m:e>
+                            <m:r>
+                              <a:rPr lang="ru-RU" i="1"/>
+                              <m:t>𝑉</m:t>
+                            </m:r>
+                          </m:e>
+                        </m:acc>
+                        <m:r>
+                          <a:rPr lang="ru-RU" i="1"/>
+                          <m:t>,</m:t>
+                        </m:r>
+                        <m:sSup>
+                          <m:sSupPr>
+                            <m:ctrlPr>
+                              <a:rPr lang="ru-RU" i="1"/>
+                            </m:ctrlPr>
+                          </m:sSupPr>
+                          <m:e>
+                            <m:r>
+                              <a:rPr lang="ru-RU" i="1"/>
+                              <m:t>𝑉</m:t>
+                            </m:r>
+                          </m:e>
+                          <m:sup>
+                            <m:r>
+                              <a:rPr lang="ru-RU" i="1"/>
+                              <m:t>+</m:t>
+                            </m:r>
+                          </m:sup>
+                        </m:sSup>
+                      </m:e>
+                    </m:d>
+                    <m:r>
+                      <a:rPr lang="ru-RU" i="1"/>
+                      <m:t>∈</m:t>
+                    </m:r>
+                    <m:r>
+                      <a:rPr lang="ru-RU" i="1"/>
+                      <m:t>𝐴</m:t>
+                    </m:r>
+                    <m:r>
+                      <a:rPr lang="ru-RU" i="1"/>
+                      <m:t>⇒</m:t>
+                    </m:r>
+                    <m:acc>
+                      <m:accPr>
+                        <m:chr m:val="̃"/>
+                        <m:ctrlPr>
+                          <a:rPr lang="ru-RU" i="1"/>
+                        </m:ctrlPr>
+                      </m:accPr>
+                      <m:e>
+                        <m:r>
+                          <a:rPr lang="ru-RU" i="1"/>
+                          <m:t>𝑉</m:t>
+                        </m:r>
+                      </m:e>
+                    </m:acc>
+                    <m:r>
+                      <a:rPr lang="ru-RU" i="1"/>
+                      <m:t>∈</m:t>
+                    </m:r>
+                    <m:r>
+                      <a:rPr lang="ru-RU" i="1"/>
+                      <m:t>𝜎</m:t>
+                    </m:r>
+                  </m:oMath>
+                </a14:m>
+                <a:endParaRPr lang="en-US" dirty="0"/>
+              </a:p>
+              <a:p>
+                <a:pPr marL="1200150" lvl="2" indent="-285750">
+                  <a:buFont typeface="Arial" panose="020B0604020202020204" pitchFamily="34" charset="0"/>
+                  <a:buChar char="•"/>
+                </a:pPr>
+                <a:r>
+                  <a:rPr lang="ru-RU" dirty="0"/>
+                  <a:t>Сокращение размера дерева поиска</a:t>
+                </a:r>
+              </a:p>
+              <a:p>
+                <a:pPr marL="742950" lvl="1" indent="-285750">
+                  <a:buFont typeface="Arial" panose="020B0604020202020204" pitchFamily="34" charset="0"/>
+                  <a:buChar char="•"/>
+                </a:pPr>
+                <a:endParaRPr lang="ru-RU" dirty="0"/>
+              </a:p>
+            </p:txBody>
+          </p:sp>
+        </mc:Choice>
+        <mc:Fallback>
+          <p:sp>
+            <p:nvSpPr>
+              <p:cNvPr id="9" name="TextBox 8">
+                <a:extLst>
+                  <a:ext uri="{FF2B5EF4-FFF2-40B4-BE49-F238E27FC236}">
+                    <a16:creationId xmlns:a16="http://schemas.microsoft.com/office/drawing/2014/main" id="{83D75914-E56B-423F-B860-A82574DF027F}"/>
+                  </a:ext>
+                </a:extLst>
+              </p:cNvPr>
+              <p:cNvSpPr txBox="1">
+                <a:spLocks noRot="1" noChangeAspect="1" noMove="1" noResize="1" noEditPoints="1" noAdjustHandles="1" noChangeArrowheads="1" noChangeShapeType="1" noTextEdit="1"/>
+              </p:cNvSpPr>
+              <p:nvPr/>
+            </p:nvSpPr>
+            <p:spPr>
+              <a:xfrm>
+                <a:off x="6165908" y="3196205"/>
+                <a:ext cx="5847126" cy="3020314"/>
+              </a:xfrm>
+              <a:prstGeom prst="rect">
+                <a:avLst/>
+              </a:prstGeom>
+              <a:blipFill>
+                <a:blip r:embed="rId4"/>
+                <a:stretch>
+                  <a:fillRect/>
+                </a:stretch>
+              </a:blipFill>
+              <a:ln>
+                <a:solidFill>
+                  <a:schemeClr val="tx1"/>
+                </a:solidFill>
+              </a:ln>
+              <a:effectLst>
+                <a:outerShdw blurRad="50800" dist="38100" dir="2700000" algn="tl" rotWithShape="0">
+                  <a:prstClr val="black">
+                    <a:alpha val="40000"/>
+                  </a:prstClr>
+                </a:outerShdw>
+              </a:effectLst>
+            </p:spPr>
+            <p:txBody>
+              <a:bodyPr/>
+              <a:lstStyle/>
+              <a:p>
+                <a:r>
+                  <a:rPr lang="ru-RU">
+                    <a:noFill/>
+                  </a:rPr>
+                  <a:t> </a:t>
+                </a:r>
+              </a:p>
+            </p:txBody>
+          </p:sp>
+        </mc:Fallback>
+      </mc:AlternateContent>
+    </p:spTree>
+    <p:extLst>
+      <p:ext uri="{BB962C8B-B14F-4D97-AF65-F5344CB8AC3E}">
+        <p14:creationId xmlns:p14="http://schemas.microsoft.com/office/powerpoint/2010/main" val="2989617858"/>
       </p:ext>
     </p:extLst>
   </p:cSld>

</xml_diff>